<commit_message>
Updates to project artifacts
Project and Sprint Plan updates
</commit_message>
<xml_diff>
--- a/Project Artifacts/NETE GSA Agile Project Plan.pptx
+++ b/Project Artifacts/NETE GSA Agile Project Plan.pptx
@@ -149,7 +149,7 @@
   </p:defaultTextStyle>
   <p:extLst>
     <p:ext uri="{EFAFB233-063F-42B5-8137-9DF3F51BA10A}">
-      <p15:sldGuideLst xmlns:p15="http://schemas.microsoft.com/office/powerpoint/2012/main" xmlns="">
+      <p15:sldGuideLst xmlns:p15="http://schemas.microsoft.com/office/powerpoint/2012/main">
         <p15:guide id="1" orient="horz" pos="1960">
           <p15:clr>
             <a:srgbClr val="A4A3A4"/>
@@ -163,7 +163,7 @@
       </p15:sldGuideLst>
     </p:ext>
     <p:ext uri="{2D200454-40CA-4A62-9FC3-DE9A4176ACB9}">
-      <p15:notesGuideLst xmlns:p15="http://schemas.microsoft.com/office/powerpoint/2012/main" xmlns="">
+      <p15:notesGuideLst xmlns:p15="http://schemas.microsoft.com/office/powerpoint/2012/main">
         <p15:guide id="1" orient="horz" pos="2749">
           <p15:clr>
             <a:srgbClr val="A4A3A4"/>
@@ -277,7 +277,7 @@
               <a:pPr>
                 <a:defRPr/>
               </a:pPr>
-              <a:t>6/23/2015</a:t>
+              <a:t>6/24/2015</a:t>
             </a:fld>
             <a:endParaRPr lang="en-US" dirty="0"/>
           </a:p>
@@ -1361,7 +1361,7 @@
             <a:fld id="{EE5BBF6C-F8F4-4AC9-BA98-49F7A32F3B91}" type="datetimeFigureOut">
               <a:rPr lang="en-US" smtClean="0"/>
               <a:pPr/>
-              <a:t>6/23/2015</a:t>
+              <a:t>6/24/2015</a:t>
             </a:fld>
             <a:endParaRPr lang="en-US"/>
           </a:p>
@@ -1528,7 +1528,7 @@
             <a:fld id="{EE5BBF6C-F8F4-4AC9-BA98-49F7A32F3B91}" type="datetimeFigureOut">
               <a:rPr lang="en-US" smtClean="0"/>
               <a:pPr/>
-              <a:t>6/23/2015</a:t>
+              <a:t>6/24/2015</a:t>
             </a:fld>
             <a:endParaRPr lang="en-US"/>
           </a:p>
@@ -1705,7 +1705,7 @@
             <a:fld id="{EE5BBF6C-F8F4-4AC9-BA98-49F7A32F3B91}" type="datetimeFigureOut">
               <a:rPr lang="en-US" smtClean="0"/>
               <a:pPr/>
-              <a:t>6/23/2015</a:t>
+              <a:t>6/24/2015</a:t>
             </a:fld>
             <a:endParaRPr lang="en-US"/>
           </a:p>
@@ -1990,7 +1990,7 @@
             <a:fld id="{EE5BBF6C-F8F4-4AC9-BA98-49F7A32F3B91}" type="datetimeFigureOut">
               <a:rPr lang="en-US" smtClean="0"/>
               <a:pPr/>
-              <a:t>6/23/2015</a:t>
+              <a:t>6/24/2015</a:t>
             </a:fld>
             <a:endParaRPr lang="en-US"/>
           </a:p>
@@ -2233,7 +2233,7 @@
             <a:fld id="{EE5BBF6C-F8F4-4AC9-BA98-49F7A32F3B91}" type="datetimeFigureOut">
               <a:rPr lang="en-US" smtClean="0"/>
               <a:pPr/>
-              <a:t>6/23/2015</a:t>
+              <a:t>6/24/2015</a:t>
             </a:fld>
             <a:endParaRPr lang="en-US"/>
           </a:p>
@@ -2518,7 +2518,7 @@
             <a:fld id="{EE5BBF6C-F8F4-4AC9-BA98-49F7A32F3B91}" type="datetimeFigureOut">
               <a:rPr lang="en-US" smtClean="0"/>
               <a:pPr/>
-              <a:t>6/23/2015</a:t>
+              <a:t>6/24/2015</a:t>
             </a:fld>
             <a:endParaRPr lang="en-US"/>
           </a:p>
@@ -2942,7 +2942,7 @@
             <a:fld id="{EE5BBF6C-F8F4-4AC9-BA98-49F7A32F3B91}" type="datetimeFigureOut">
               <a:rPr lang="en-US" smtClean="0"/>
               <a:pPr/>
-              <a:t>6/23/2015</a:t>
+              <a:t>6/24/2015</a:t>
             </a:fld>
             <a:endParaRPr lang="en-US"/>
           </a:p>
@@ -3057,7 +3057,7 @@
             <a:fld id="{EE5BBF6C-F8F4-4AC9-BA98-49F7A32F3B91}" type="datetimeFigureOut">
               <a:rPr lang="en-US" smtClean="0"/>
               <a:pPr/>
-              <a:t>6/23/2015</a:t>
+              <a:t>6/24/2015</a:t>
             </a:fld>
             <a:endParaRPr lang="en-US"/>
           </a:p>
@@ -3149,7 +3149,7 @@
             <a:fld id="{EE5BBF6C-F8F4-4AC9-BA98-49F7A32F3B91}" type="datetimeFigureOut">
               <a:rPr lang="en-US" smtClean="0"/>
               <a:pPr/>
-              <a:t>6/23/2015</a:t>
+              <a:t>6/24/2015</a:t>
             </a:fld>
             <a:endParaRPr lang="en-US"/>
           </a:p>
@@ -3423,7 +3423,7 @@
             <a:fld id="{EE5BBF6C-F8F4-4AC9-BA98-49F7A32F3B91}" type="datetimeFigureOut">
               <a:rPr lang="en-US" smtClean="0"/>
               <a:pPr/>
-              <a:t>6/23/2015</a:t>
+              <a:t>6/24/2015</a:t>
             </a:fld>
             <a:endParaRPr lang="en-US"/>
           </a:p>
@@ -3673,7 +3673,7 @@
             <a:fld id="{EE5BBF6C-F8F4-4AC9-BA98-49F7A32F3B91}" type="datetimeFigureOut">
               <a:rPr lang="en-US" smtClean="0"/>
               <a:pPr/>
-              <a:t>6/23/2015</a:t>
+              <a:t>6/24/2015</a:t>
             </a:fld>
             <a:endParaRPr lang="en-US"/>
           </a:p>
@@ -3892,7 +3892,7 @@
             <a:fld id="{EE5BBF6C-F8F4-4AC9-BA98-49F7A32F3B91}" type="datetimeFigureOut">
               <a:rPr lang="en-US" smtClean="0"/>
               <a:pPr/>
-              <a:t>6/23/2015</a:t>
+              <a:t>6/24/2015</a:t>
             </a:fld>
             <a:endParaRPr lang="en-US"/>
           </a:p>
@@ -4658,10 +4658,10 @@
               <a:t>6/21/2015 – 6/26/2015 </a:t>
             </a:r>
             <a:r>
-              <a:rPr lang="fi-FI" b="1" i="1" dirty="0" smtClean="0">
+              <a:rPr lang="fi-FI" b="1" i="1" dirty="0" err="1" smtClean="0">
                 <a:latin typeface="Calibri" charset="0"/>
               </a:rPr>
-              <a:t>Timeline</a:t>
+              <a:t>Timelines</a:t>
             </a:r>
             <a:endParaRPr lang="en-US" b="1" i="1" dirty="0" smtClean="0">
               <a:latin typeface="Calibri" charset="0"/>
@@ -4783,16 +4783,7 @@
                 </a:solidFill>
                 <a:latin typeface="Calibri" charset="0"/>
               </a:rPr>
-              <a:t>JUNE </a:t>
-            </a:r>
-            <a:r>
-              <a:rPr lang="en-US" b="1" i="1" dirty="0" smtClean="0">
-                <a:solidFill>
-                  <a:srgbClr val="004586"/>
-                </a:solidFill>
-                <a:latin typeface="Calibri" charset="0"/>
-              </a:rPr>
-              <a:t>2015</a:t>
+              <a:t>June 2015</a:t>
             </a:r>
             <a:endParaRPr lang="en-US" sz="4000" b="1" dirty="0">
               <a:solidFill>
@@ -5707,7 +5698,9 @@
             <a:r>
               <a:rPr lang="en-US" sz="1650" kern="0" dirty="0">
                 <a:solidFill>
-                  <a:srgbClr val="004586"/>
+                  <a:schemeClr val="accent3">
+                    <a:lumMod val="75000"/>
+                  </a:schemeClr>
                 </a:solidFill>
                 <a:latin typeface="Calibri" pitchFamily="34" charset="0"/>
                 <a:cs typeface="Calibri" pitchFamily="34" charset="0"/>
@@ -5733,7 +5726,9 @@
             <a:r>
               <a:rPr lang="en-US" sz="1650" kern="0" dirty="0">
                 <a:solidFill>
-                  <a:srgbClr val="004586"/>
+                  <a:schemeClr val="accent3">
+                    <a:lumMod val="75000"/>
+                  </a:schemeClr>
                 </a:solidFill>
                 <a:latin typeface="Calibri" pitchFamily="34" charset="0"/>
                 <a:cs typeface="Calibri" pitchFamily="34" charset="0"/>
@@ -5743,7 +5738,9 @@
             <a:r>
               <a:rPr lang="en-US" sz="1650" kern="0" dirty="0" err="1">
                 <a:solidFill>
-                  <a:srgbClr val="004586"/>
+                  <a:schemeClr val="accent3">
+                    <a:lumMod val="75000"/>
+                  </a:schemeClr>
                 </a:solidFill>
                 <a:latin typeface="Calibri" pitchFamily="34" charset="0"/>
                 <a:cs typeface="Calibri" pitchFamily="34" charset="0"/>
@@ -5752,7 +5749,9 @@
             </a:r>
             <a:endParaRPr lang="en-US" sz="1650" kern="0" dirty="0">
               <a:solidFill>
-                <a:srgbClr val="004586"/>
+                <a:schemeClr val="accent3">
+                  <a:lumMod val="75000"/>
+                </a:schemeClr>
               </a:solidFill>
               <a:latin typeface="Calibri" pitchFamily="34" charset="0"/>
               <a:cs typeface="Calibri" pitchFamily="34" charset="0"/>
@@ -5776,7 +5775,9 @@
             <a:r>
               <a:rPr lang="en-US" sz="1650" kern="0" dirty="0">
                 <a:solidFill>
-                  <a:srgbClr val="004586"/>
+                  <a:schemeClr val="accent3">
+                    <a:lumMod val="75000"/>
+                  </a:schemeClr>
                 </a:solidFill>
                 <a:latin typeface="Calibri" pitchFamily="34" charset="0"/>
                 <a:cs typeface="Calibri" pitchFamily="34" charset="0"/>
@@ -5802,7 +5803,9 @@
             <a:r>
               <a:rPr lang="en-US" sz="1650" kern="0" dirty="0">
                 <a:solidFill>
-                  <a:srgbClr val="004586"/>
+                  <a:schemeClr val="accent3">
+                    <a:lumMod val="75000"/>
+                  </a:schemeClr>
                 </a:solidFill>
                 <a:latin typeface="Calibri" pitchFamily="34" charset="0"/>
                 <a:cs typeface="Calibri" pitchFamily="34" charset="0"/>
@@ -5828,7 +5831,9 @@
             <a:r>
               <a:rPr lang="en-US" sz="1650" kern="0" dirty="0">
                 <a:solidFill>
-                  <a:srgbClr val="004586"/>
+                  <a:schemeClr val="accent3">
+                    <a:lumMod val="75000"/>
+                  </a:schemeClr>
                 </a:solidFill>
                 <a:latin typeface="Calibri" pitchFamily="34" charset="0"/>
                 <a:cs typeface="Calibri" pitchFamily="34" charset="0"/>
@@ -5854,7 +5859,9 @@
             <a:r>
               <a:rPr lang="en-US" sz="1650" kern="0" dirty="0">
                 <a:solidFill>
-                  <a:srgbClr val="004586"/>
+                  <a:schemeClr val="accent3">
+                    <a:lumMod val="75000"/>
+                  </a:schemeClr>
                 </a:solidFill>
                 <a:latin typeface="Calibri" pitchFamily="34" charset="0"/>
                 <a:cs typeface="Calibri" pitchFamily="34" charset="0"/>
@@ -5864,7 +5871,9 @@
             <a:r>
               <a:rPr lang="en-US" sz="1650" kern="0" dirty="0" err="1">
                 <a:solidFill>
-                  <a:srgbClr val="004586"/>
+                  <a:schemeClr val="accent3">
+                    <a:lumMod val="75000"/>
+                  </a:schemeClr>
                 </a:solidFill>
                 <a:latin typeface="Calibri" pitchFamily="34" charset="0"/>
                 <a:cs typeface="Calibri" pitchFamily="34" charset="0"/>
@@ -5874,7 +5883,9 @@
             <a:r>
               <a:rPr lang="en-US" sz="1650" kern="0" dirty="0">
                 <a:solidFill>
-                  <a:srgbClr val="004586"/>
+                  <a:schemeClr val="accent3">
+                    <a:lumMod val="75000"/>
+                  </a:schemeClr>
                 </a:solidFill>
                 <a:latin typeface="Calibri" pitchFamily="34" charset="0"/>
                 <a:cs typeface="Calibri" pitchFamily="34" charset="0"/>
@@ -5936,7 +5947,9 @@
             <a:r>
               <a:rPr lang="en-US" sz="1650" kern="0" dirty="0" smtClean="0">
                 <a:solidFill>
-                  <a:srgbClr val="004586"/>
+                  <a:schemeClr val="accent3">
+                    <a:lumMod val="75000"/>
+                  </a:schemeClr>
                 </a:solidFill>
                 <a:latin typeface="Calibri" pitchFamily="34" charset="0"/>
                 <a:cs typeface="Calibri" pitchFamily="34" charset="0"/>
@@ -5945,7 +5958,9 @@
             </a:r>
             <a:endParaRPr lang="en-US" sz="1650" kern="0" dirty="0">
               <a:solidFill>
-                <a:srgbClr val="004586"/>
+                <a:schemeClr val="accent3">
+                  <a:lumMod val="75000"/>
+                </a:schemeClr>
               </a:solidFill>
               <a:latin typeface="Calibri" pitchFamily="34" charset="0"/>
               <a:cs typeface="Calibri" pitchFamily="34" charset="0"/>
@@ -5969,7 +5984,9 @@
             <a:r>
               <a:rPr lang="en-US" sz="1650" kern="0" dirty="0">
                 <a:solidFill>
-                  <a:srgbClr val="004586"/>
+                  <a:schemeClr val="accent3">
+                    <a:lumMod val="75000"/>
+                  </a:schemeClr>
                 </a:solidFill>
                 <a:latin typeface="Calibri" pitchFamily="34" charset="0"/>
                 <a:cs typeface="Calibri" pitchFamily="34" charset="0"/>
@@ -5978,7 +5995,9 @@
             </a:r>
             <a:endParaRPr lang="en-US" sz="1650" kern="0" dirty="0" smtClean="0">
               <a:solidFill>
-                <a:srgbClr val="004586"/>
+                <a:schemeClr val="accent3">
+                  <a:lumMod val="75000"/>
+                </a:schemeClr>
               </a:solidFill>
               <a:latin typeface="Calibri" pitchFamily="34" charset="0"/>
               <a:cs typeface="Calibri" pitchFamily="34" charset="0"/>
@@ -6071,7 +6090,9 @@
             <a:r>
               <a:rPr lang="en-US" sz="1650" kern="0" dirty="0">
                 <a:solidFill>
-                  <a:srgbClr val="004586"/>
+                  <a:schemeClr val="accent3">
+                    <a:lumMod val="75000"/>
+                  </a:schemeClr>
                 </a:solidFill>
                 <a:latin typeface="Calibri" pitchFamily="34" charset="0"/>
                 <a:cs typeface="Calibri" pitchFamily="34" charset="0"/>
@@ -6097,7 +6118,9 @@
             <a:r>
               <a:rPr lang="en-US" sz="1650" kern="0" dirty="0">
                 <a:solidFill>
-                  <a:srgbClr val="004586"/>
+                  <a:schemeClr val="accent3">
+                    <a:lumMod val="75000"/>
+                  </a:schemeClr>
                 </a:solidFill>
                 <a:latin typeface="Calibri" pitchFamily="34" charset="0"/>
                 <a:cs typeface="Calibri" pitchFamily="34" charset="0"/>
@@ -6107,7 +6130,9 @@
             <a:r>
               <a:rPr lang="en-US" sz="1650" kern="0" dirty="0" smtClean="0">
                 <a:solidFill>
-                  <a:srgbClr val="004586"/>
+                  <a:schemeClr val="accent3">
+                    <a:lumMod val="75000"/>
+                  </a:schemeClr>
                 </a:solidFill>
                 <a:latin typeface="Calibri" pitchFamily="34" charset="0"/>
                 <a:cs typeface="Calibri" pitchFamily="34" charset="0"/>
@@ -6133,7 +6158,9 @@
             <a:r>
               <a:rPr lang="en-US" sz="1650" kern="0" dirty="0" smtClean="0">
                 <a:solidFill>
-                  <a:srgbClr val="004586"/>
+                  <a:schemeClr val="accent3">
+                    <a:lumMod val="75000"/>
+                  </a:schemeClr>
                 </a:solidFill>
                 <a:latin typeface="Calibri" pitchFamily="34" charset="0"/>
                 <a:cs typeface="Calibri" pitchFamily="34" charset="0"/>
@@ -6142,7 +6169,9 @@
             </a:r>
             <a:endParaRPr lang="en-US" sz="1650" kern="0" dirty="0">
               <a:solidFill>
-                <a:srgbClr val="004586"/>
+                <a:schemeClr val="accent3">
+                  <a:lumMod val="75000"/>
+                </a:schemeClr>
               </a:solidFill>
               <a:latin typeface="Calibri" pitchFamily="34" charset="0"/>
               <a:cs typeface="Calibri" pitchFamily="34" charset="0"/>
@@ -6166,7 +6195,9 @@
             <a:r>
               <a:rPr lang="en-US" sz="1650" kern="0" dirty="0">
                 <a:solidFill>
-                  <a:srgbClr val="004586"/>
+                  <a:schemeClr val="accent3">
+                    <a:lumMod val="75000"/>
+                  </a:schemeClr>
                 </a:solidFill>
                 <a:latin typeface="Calibri" pitchFamily="34" charset="0"/>
                 <a:cs typeface="Calibri" pitchFamily="34" charset="0"/>
@@ -6218,7 +6249,9 @@
             <a:r>
               <a:rPr lang="en-US" sz="1650" kern="0" dirty="0">
                 <a:solidFill>
-                  <a:srgbClr val="004586"/>
+                  <a:schemeClr val="accent3">
+                    <a:lumMod val="75000"/>
+                  </a:schemeClr>
                 </a:solidFill>
                 <a:latin typeface="Calibri" pitchFamily="34" charset="0"/>
                 <a:cs typeface="Calibri" pitchFamily="34" charset="0"/>
@@ -6417,7 +6450,7 @@
         <p:spPr>
           <a:xfrm>
             <a:off x="488504" y="764704"/>
-            <a:ext cx="8729860" cy="4779770"/>
+            <a:ext cx="8729860" cy="4533549"/>
           </a:xfrm>
           <a:prstGeom prst="rect">
             <a:avLst/>
@@ -6486,174 +6519,14 @@
               <a:defRPr/>
             </a:pPr>
             <a:r>
-              <a:rPr lang="fi-FI" sz="1600" kern="0" dirty="0" err="1">
-                <a:solidFill>
-                  <a:srgbClr val="004586"/>
-                </a:solidFill>
-                <a:latin typeface="Calibri" pitchFamily="34" charset="0"/>
-                <a:cs typeface="Calibri" pitchFamily="34" charset="0"/>
-              </a:rPr>
-              <a:t>Build</a:t>
-            </a:r>
-            <a:r>
-              <a:rPr lang="fi-FI" sz="1600" kern="0" dirty="0">
-                <a:solidFill>
-                  <a:srgbClr val="004586"/>
-                </a:solidFill>
-                <a:latin typeface="Calibri" pitchFamily="34" charset="0"/>
-                <a:cs typeface="Calibri" pitchFamily="34" charset="0"/>
-              </a:rPr>
-              <a:t> a </a:t>
-            </a:r>
-            <a:r>
-              <a:rPr lang="fi-FI" sz="1600" kern="0" dirty="0" err="1">
-                <a:solidFill>
-                  <a:srgbClr val="004586"/>
-                </a:solidFill>
-                <a:latin typeface="Calibri" pitchFamily="34" charset="0"/>
-                <a:cs typeface="Calibri" pitchFamily="34" charset="0"/>
-              </a:rPr>
-              <a:t>system</a:t>
-            </a:r>
-            <a:r>
-              <a:rPr lang="fi-FI" sz="1600" kern="0" dirty="0">
-                <a:solidFill>
-                  <a:srgbClr val="004586"/>
-                </a:solidFill>
-                <a:latin typeface="Calibri" pitchFamily="34" charset="0"/>
-                <a:cs typeface="Calibri" pitchFamily="34" charset="0"/>
-              </a:rPr>
-              <a:t>/</a:t>
-            </a:r>
-            <a:r>
-              <a:rPr lang="fi-FI" sz="1600" kern="0" dirty="0" err="1">
-                <a:solidFill>
-                  <a:srgbClr val="004586"/>
-                </a:solidFill>
-                <a:latin typeface="Calibri" pitchFamily="34" charset="0"/>
-                <a:cs typeface="Calibri" pitchFamily="34" charset="0"/>
-              </a:rPr>
-              <a:t>tool</a:t>
-            </a:r>
-            <a:r>
-              <a:rPr lang="fi-FI" sz="1600" kern="0" dirty="0">
-                <a:solidFill>
-                  <a:srgbClr val="004586"/>
-                </a:solidFill>
-                <a:latin typeface="Calibri" pitchFamily="34" charset="0"/>
-                <a:cs typeface="Calibri" pitchFamily="34" charset="0"/>
-              </a:rPr>
-              <a:t> to </a:t>
-            </a:r>
-            <a:r>
-              <a:rPr lang="fi-FI" sz="1600" kern="0" dirty="0" err="1">
-                <a:solidFill>
-                  <a:srgbClr val="004586"/>
-                </a:solidFill>
-                <a:latin typeface="Calibri" pitchFamily="34" charset="0"/>
-                <a:cs typeface="Calibri" pitchFamily="34" charset="0"/>
-              </a:rPr>
-              <a:t>report</a:t>
-            </a:r>
-            <a:r>
-              <a:rPr lang="fi-FI" sz="1600" kern="0" dirty="0">
-                <a:solidFill>
-                  <a:srgbClr val="004586"/>
-                </a:solidFill>
-                <a:latin typeface="Calibri" pitchFamily="34" charset="0"/>
-                <a:cs typeface="Calibri" pitchFamily="34" charset="0"/>
-              </a:rPr>
-              <a:t> side </a:t>
-            </a:r>
-            <a:r>
-              <a:rPr lang="fi-FI" sz="1600" kern="0" dirty="0" err="1">
-                <a:solidFill>
-                  <a:srgbClr val="004586"/>
-                </a:solidFill>
-                <a:latin typeface="Calibri" pitchFamily="34" charset="0"/>
-                <a:cs typeface="Calibri" pitchFamily="34" charset="0"/>
-              </a:rPr>
-              <a:t>effects</a:t>
-            </a:r>
-            <a:r>
-              <a:rPr lang="fi-FI" sz="1600" kern="0" dirty="0">
-                <a:solidFill>
-                  <a:srgbClr val="004586"/>
-                </a:solidFill>
-                <a:latin typeface="Calibri" pitchFamily="34" charset="0"/>
-                <a:cs typeface="Calibri" pitchFamily="34" charset="0"/>
-              </a:rPr>
-              <a:t> of </a:t>
-            </a:r>
-            <a:r>
-              <a:rPr lang="fi-FI" sz="1600" kern="0" dirty="0" err="1">
-                <a:solidFill>
-                  <a:srgbClr val="004586"/>
-                </a:solidFill>
-                <a:latin typeface="Calibri" pitchFamily="34" charset="0"/>
-                <a:cs typeface="Calibri" pitchFamily="34" charset="0"/>
-              </a:rPr>
-              <a:t>adverse</a:t>
-            </a:r>
-            <a:r>
-              <a:rPr lang="fi-FI" sz="1600" kern="0" dirty="0">
-                <a:solidFill>
-                  <a:srgbClr val="004586"/>
-                </a:solidFill>
-                <a:latin typeface="Calibri" pitchFamily="34" charset="0"/>
-                <a:cs typeface="Calibri" pitchFamily="34" charset="0"/>
-              </a:rPr>
-              <a:t> </a:t>
-            </a:r>
-            <a:r>
-              <a:rPr lang="fi-FI" sz="1600" kern="0" dirty="0" err="1">
-                <a:solidFill>
-                  <a:srgbClr val="004586"/>
-                </a:solidFill>
-                <a:latin typeface="Calibri" pitchFamily="34" charset="0"/>
-                <a:cs typeface="Calibri" pitchFamily="34" charset="0"/>
-              </a:rPr>
-              <a:t>Drugs</a:t>
-            </a:r>
-            <a:r>
-              <a:rPr lang="fi-FI" sz="1600" kern="0" dirty="0">
-                <a:solidFill>
-                  <a:srgbClr val="004586"/>
-                </a:solidFill>
-                <a:latin typeface="Calibri" pitchFamily="34" charset="0"/>
-                <a:cs typeface="Calibri" pitchFamily="34" charset="0"/>
-              </a:rPr>
-              <a:t>, </a:t>
-            </a:r>
-            <a:r>
-              <a:rPr lang="fi-FI" sz="1600" kern="0" dirty="0" err="1">
-                <a:solidFill>
-                  <a:srgbClr val="004586"/>
-                </a:solidFill>
-                <a:latin typeface="Calibri" pitchFamily="34" charset="0"/>
-                <a:cs typeface="Calibri" pitchFamily="34" charset="0"/>
-              </a:rPr>
-              <a:t>Vaccines</a:t>
-            </a:r>
-            <a:r>
-              <a:rPr lang="fi-FI" sz="1600" kern="0" dirty="0">
-                <a:solidFill>
-                  <a:srgbClr val="004586"/>
-                </a:solidFill>
-                <a:latin typeface="Calibri" pitchFamily="34" charset="0"/>
-                <a:cs typeface="Calibri" pitchFamily="34" charset="0"/>
-              </a:rPr>
-              <a:t> and </a:t>
-            </a:r>
-            <a:r>
-              <a:rPr lang="fi-FI" sz="1600" kern="0" dirty="0" err="1">
-                <a:solidFill>
-                  <a:srgbClr val="004586"/>
-                </a:solidFill>
-                <a:latin typeface="Calibri" pitchFamily="34" charset="0"/>
-                <a:cs typeface="Calibri" pitchFamily="34" charset="0"/>
-              </a:rPr>
-              <a:t>Devices</a:t>
+              <a:rPr lang="fi-FI" sz="1600" kern="0" smtClean="0">
+                <a:solidFill>
+                  <a:srgbClr val="004586"/>
+                </a:solidFill>
+                <a:latin typeface="Calibri" pitchFamily="34" charset="0"/>
+                <a:cs typeface="Calibri" pitchFamily="34" charset="0"/>
+              </a:rPr>
+              <a:t>Node.JS</a:t>
             </a:r>
             <a:endParaRPr lang="fi-FI" sz="1600" kern="0" dirty="0">
               <a:solidFill>
@@ -6686,38 +6559,15 @@
                 <a:latin typeface="Calibri" pitchFamily="34" charset="0"/>
                 <a:cs typeface="Calibri" pitchFamily="34" charset="0"/>
               </a:rPr>
-              <a:t>Identify</a:t>
-            </a:r>
-            <a:r>
-              <a:rPr lang="fi-FI" sz="1600" kern="0" dirty="0">
-                <a:solidFill>
-                  <a:srgbClr val="004586"/>
-                </a:solidFill>
-                <a:latin typeface="Calibri" pitchFamily="34" charset="0"/>
-                <a:cs typeface="Calibri" pitchFamily="34" charset="0"/>
-              </a:rPr>
-              <a:t> </a:t>
-            </a:r>
-            <a:r>
-              <a:rPr lang="fi-FI" sz="1600" kern="0" dirty="0" err="1">
-                <a:solidFill>
-                  <a:srgbClr val="004586"/>
-                </a:solidFill>
-                <a:latin typeface="Calibri" pitchFamily="34" charset="0"/>
-                <a:cs typeface="Calibri" pitchFamily="34" charset="0"/>
-              </a:rPr>
-              <a:t>the</a:t>
-            </a:r>
-            <a:r>
-              <a:rPr lang="fi-FI" sz="1600" kern="0" dirty="0">
-                <a:solidFill>
-                  <a:srgbClr val="004586"/>
-                </a:solidFill>
-                <a:latin typeface="Calibri" pitchFamily="34" charset="0"/>
-                <a:cs typeface="Calibri" pitchFamily="34" charset="0"/>
-              </a:rPr>
-              <a:t> Data Set</a:t>
-            </a:r>
+              <a:t>Angular.JS</a:t>
+            </a:r>
+            <a:endParaRPr lang="fi-FI" sz="1600" kern="0" dirty="0">
+              <a:solidFill>
+                <a:srgbClr val="004586"/>
+              </a:solidFill>
+              <a:latin typeface="Calibri" pitchFamily="34" charset="0"/>
+              <a:cs typeface="Calibri" pitchFamily="34" charset="0"/>
+            </a:endParaRPr>
           </a:p>
           <a:p>
             <a:pPr indent="-311030" defTabSz="414706" eaLnBrk="0" hangingPunct="0">
@@ -6742,15 +6592,78 @@
                 <a:latin typeface="Calibri" pitchFamily="34" charset="0"/>
                 <a:cs typeface="Calibri" pitchFamily="34" charset="0"/>
               </a:rPr>
-              <a:t>Node.JS</a:t>
-            </a:r>
-            <a:endParaRPr lang="fi-FI" sz="1600" kern="0" dirty="0">
-              <a:solidFill>
-                <a:srgbClr val="004586"/>
-              </a:solidFill>
-              <a:latin typeface="Calibri" pitchFamily="34" charset="0"/>
-              <a:cs typeface="Calibri" pitchFamily="34" charset="0"/>
-            </a:endParaRPr>
+              <a:t>Gulp.js</a:t>
+            </a:r>
+            <a:r>
+              <a:rPr lang="fi-FI" sz="1600" kern="0" dirty="0">
+                <a:solidFill>
+                  <a:srgbClr val="004586"/>
+                </a:solidFill>
+                <a:latin typeface="Calibri" pitchFamily="34" charset="0"/>
+                <a:cs typeface="Calibri" pitchFamily="34" charset="0"/>
+              </a:rPr>
+              <a:t> </a:t>
+            </a:r>
+            <a:r>
+              <a:rPr lang="fi-FI" sz="1600" kern="0" dirty="0" err="1">
+                <a:solidFill>
+                  <a:srgbClr val="004586"/>
+                </a:solidFill>
+                <a:latin typeface="Calibri" pitchFamily="34" charset="0"/>
+                <a:cs typeface="Calibri" pitchFamily="34" charset="0"/>
+              </a:rPr>
+              <a:t>the</a:t>
+            </a:r>
+            <a:r>
+              <a:rPr lang="fi-FI" sz="1600" kern="0" dirty="0">
+                <a:solidFill>
+                  <a:srgbClr val="004586"/>
+                </a:solidFill>
+                <a:latin typeface="Calibri" pitchFamily="34" charset="0"/>
+                <a:cs typeface="Calibri" pitchFamily="34" charset="0"/>
+              </a:rPr>
+              <a:t> </a:t>
+            </a:r>
+            <a:r>
+              <a:rPr lang="fi-FI" sz="1600" kern="0" dirty="0" err="1">
+                <a:solidFill>
+                  <a:srgbClr val="004586"/>
+                </a:solidFill>
+                <a:latin typeface="Calibri" pitchFamily="34" charset="0"/>
+                <a:cs typeface="Calibri" pitchFamily="34" charset="0"/>
+              </a:rPr>
+              <a:t>streaming</a:t>
+            </a:r>
+            <a:r>
+              <a:rPr lang="fi-FI" sz="1600" kern="0" dirty="0">
+                <a:solidFill>
+                  <a:srgbClr val="004586"/>
+                </a:solidFill>
+                <a:latin typeface="Calibri" pitchFamily="34" charset="0"/>
+                <a:cs typeface="Calibri" pitchFamily="34" charset="0"/>
+              </a:rPr>
+              <a:t> </a:t>
+            </a:r>
+            <a:r>
+              <a:rPr lang="fi-FI" sz="1600" kern="0" dirty="0" err="1">
+                <a:solidFill>
+                  <a:srgbClr val="004586"/>
+                </a:solidFill>
+                <a:latin typeface="Calibri" pitchFamily="34" charset="0"/>
+                <a:cs typeface="Calibri" pitchFamily="34" charset="0"/>
+              </a:rPr>
+              <a:t>Build</a:t>
+            </a:r>
+            <a:r>
+              <a:rPr lang="fi-FI" sz="1600" kern="0" dirty="0">
+                <a:solidFill>
+                  <a:srgbClr val="004586"/>
+                </a:solidFill>
+                <a:latin typeface="Calibri" pitchFamily="34" charset="0"/>
+                <a:cs typeface="Calibri" pitchFamily="34" charset="0"/>
+              </a:rPr>
+              <a:t> System</a:t>
+            </a:r>
           </a:p>
           <a:p>
             <a:pPr indent="-311030" defTabSz="414706" eaLnBrk="0" hangingPunct="0">
@@ -6768,6 +6681,16 @@
               <a:defRPr/>
             </a:pPr>
             <a:r>
+              <a:rPr lang="fi-FI" sz="1600" kern="0" dirty="0">
+                <a:solidFill>
+                  <a:srgbClr val="004586"/>
+                </a:solidFill>
+                <a:latin typeface="Calibri" pitchFamily="34" charset="0"/>
+                <a:cs typeface="Calibri" pitchFamily="34" charset="0"/>
+              </a:rPr>
+              <a:t>KARMA – </a:t>
+            </a:r>
+            <a:r>
               <a:rPr lang="fi-FI" sz="1600" kern="0" dirty="0" err="1">
                 <a:solidFill>
                   <a:srgbClr val="004586"/>
@@ -6775,7 +6698,67 @@
                 <a:latin typeface="Calibri" pitchFamily="34" charset="0"/>
                 <a:cs typeface="Calibri" pitchFamily="34" charset="0"/>
               </a:rPr>
-              <a:t>Angular.JS</a:t>
+              <a:t>Test</a:t>
+            </a:r>
+            <a:r>
+              <a:rPr lang="fi-FI" sz="1600" kern="0" dirty="0">
+                <a:solidFill>
+                  <a:srgbClr val="004586"/>
+                </a:solidFill>
+                <a:latin typeface="Calibri" pitchFamily="34" charset="0"/>
+                <a:cs typeface="Calibri" pitchFamily="34" charset="0"/>
+              </a:rPr>
+              <a:t> </a:t>
+            </a:r>
+            <a:r>
+              <a:rPr lang="fi-FI" sz="1600" kern="0" dirty="0" err="1">
+                <a:solidFill>
+                  <a:srgbClr val="004586"/>
+                </a:solidFill>
+                <a:latin typeface="Calibri" pitchFamily="34" charset="0"/>
+                <a:cs typeface="Calibri" pitchFamily="34" charset="0"/>
+              </a:rPr>
+              <a:t>runner</a:t>
+            </a:r>
+            <a:r>
+              <a:rPr lang="fi-FI" sz="1600" kern="0" dirty="0">
+                <a:solidFill>
+                  <a:srgbClr val="004586"/>
+                </a:solidFill>
+                <a:latin typeface="Calibri" pitchFamily="34" charset="0"/>
+                <a:cs typeface="Calibri" pitchFamily="34" charset="0"/>
+              </a:rPr>
+              <a:t> </a:t>
+            </a:r>
+            <a:r>
+              <a:rPr lang="fi-FI" sz="1600" kern="0" dirty="0" err="1">
+                <a:solidFill>
+                  <a:srgbClr val="004586"/>
+                </a:solidFill>
+                <a:latin typeface="Calibri" pitchFamily="34" charset="0"/>
+                <a:cs typeface="Calibri" pitchFamily="34" charset="0"/>
+              </a:rPr>
+              <a:t>tool</a:t>
+            </a:r>
+            <a:r>
+              <a:rPr lang="fi-FI" sz="1600" kern="0" dirty="0">
+                <a:solidFill>
+                  <a:srgbClr val="004586"/>
+                </a:solidFill>
+                <a:latin typeface="Calibri" pitchFamily="34" charset="0"/>
+                <a:cs typeface="Calibri" pitchFamily="34" charset="0"/>
+              </a:rPr>
+              <a:t> for </a:t>
+            </a:r>
+            <a:r>
+              <a:rPr lang="fi-FI" sz="1600" kern="0" dirty="0" err="1">
+                <a:solidFill>
+                  <a:srgbClr val="004586"/>
+                </a:solidFill>
+                <a:latin typeface="Calibri" pitchFamily="34" charset="0"/>
+                <a:cs typeface="Calibri" pitchFamily="34" charset="0"/>
+              </a:rPr>
+              <a:t>Javascript</a:t>
             </a:r>
             <a:endParaRPr lang="fi-FI" sz="1600" kern="0" dirty="0">
               <a:solidFill>
@@ -6808,7 +6791,7 @@
                 <a:latin typeface="Calibri" pitchFamily="34" charset="0"/>
                 <a:cs typeface="Calibri" pitchFamily="34" charset="0"/>
               </a:rPr>
-              <a:t>Gulp.js</a:t>
+              <a:t>GitHub</a:t>
             </a:r>
             <a:r>
               <a:rPr lang="fi-FI" sz="1600" kern="0" dirty="0">
@@ -6818,6 +6801,26 @@
                 <a:latin typeface="Calibri" pitchFamily="34" charset="0"/>
                 <a:cs typeface="Calibri" pitchFamily="34" charset="0"/>
               </a:rPr>
+              <a:t> – Web </a:t>
+            </a:r>
+            <a:r>
+              <a:rPr lang="fi-FI" sz="1600" kern="0" dirty="0" err="1">
+                <a:solidFill>
+                  <a:srgbClr val="004586"/>
+                </a:solidFill>
+                <a:latin typeface="Calibri" pitchFamily="34" charset="0"/>
+                <a:cs typeface="Calibri" pitchFamily="34" charset="0"/>
+              </a:rPr>
+              <a:t>based</a:t>
+            </a:r>
+            <a:r>
+              <a:rPr lang="fi-FI" sz="1600" kern="0" dirty="0">
+                <a:solidFill>
+                  <a:srgbClr val="004586"/>
+                </a:solidFill>
+                <a:latin typeface="Calibri" pitchFamily="34" charset="0"/>
+                <a:cs typeface="Calibri" pitchFamily="34" charset="0"/>
+              </a:rPr>
               <a:t> </a:t>
             </a:r>
             <a:r>
@@ -6828,7 +6831,7 @@
                 <a:latin typeface="Calibri" pitchFamily="34" charset="0"/>
                 <a:cs typeface="Calibri" pitchFamily="34" charset="0"/>
               </a:rPr>
-              <a:t>the</a:t>
+              <a:t>source</a:t>
             </a:r>
             <a:r>
               <a:rPr lang="fi-FI" sz="1600" kern="0" dirty="0">
@@ -6848,7 +6851,7 @@
                 <a:latin typeface="Calibri" pitchFamily="34" charset="0"/>
                 <a:cs typeface="Calibri" pitchFamily="34" charset="0"/>
               </a:rPr>
-              <a:t>streaming</a:t>
+              <a:t>code</a:t>
             </a:r>
             <a:r>
               <a:rPr lang="fi-FI" sz="1600" kern="0" dirty="0">
@@ -6868,7 +6871,7 @@
                 <a:latin typeface="Calibri" pitchFamily="34" charset="0"/>
                 <a:cs typeface="Calibri" pitchFamily="34" charset="0"/>
               </a:rPr>
-              <a:t>Build</a:t>
+              <a:t>repository</a:t>
             </a:r>
             <a:r>
               <a:rPr lang="fi-FI" sz="1600" kern="0" dirty="0">
@@ -6878,8 +6881,45 @@
                 <a:latin typeface="Calibri" pitchFamily="34" charset="0"/>
                 <a:cs typeface="Calibri" pitchFamily="34" charset="0"/>
               </a:rPr>
-              <a:t> System</a:t>
-            </a:r>
+              <a:t> </a:t>
+            </a:r>
+            <a:r>
+              <a:rPr lang="fi-FI" sz="1600" kern="0" dirty="0" err="1">
+                <a:solidFill>
+                  <a:srgbClr val="004586"/>
+                </a:solidFill>
+                <a:latin typeface="Calibri" pitchFamily="34" charset="0"/>
+                <a:cs typeface="Calibri" pitchFamily="34" charset="0"/>
+              </a:rPr>
+              <a:t>hosting</a:t>
+            </a:r>
+            <a:r>
+              <a:rPr lang="fi-FI" sz="1600" kern="0" dirty="0">
+                <a:solidFill>
+                  <a:srgbClr val="004586"/>
+                </a:solidFill>
+                <a:latin typeface="Calibri" pitchFamily="34" charset="0"/>
+                <a:cs typeface="Calibri" pitchFamily="34" charset="0"/>
+              </a:rPr>
+              <a:t> </a:t>
+            </a:r>
+            <a:r>
+              <a:rPr lang="fi-FI" sz="1600" kern="0" dirty="0" err="1">
+                <a:solidFill>
+                  <a:srgbClr val="004586"/>
+                </a:solidFill>
+                <a:latin typeface="Calibri" pitchFamily="34" charset="0"/>
+                <a:cs typeface="Calibri" pitchFamily="34" charset="0"/>
+              </a:rPr>
+              <a:t>service</a:t>
+            </a:r>
+            <a:endParaRPr lang="fi-FI" sz="1600" kern="0" dirty="0">
+              <a:solidFill>
+                <a:srgbClr val="004586"/>
+              </a:solidFill>
+              <a:latin typeface="Calibri" pitchFamily="34" charset="0"/>
+              <a:cs typeface="Calibri" pitchFamily="34" charset="0"/>
+            </a:endParaRPr>
           </a:p>
           <a:p>
             <a:pPr indent="-311030" defTabSz="414706" eaLnBrk="0" hangingPunct="0">
@@ -6897,92 +6937,15 @@
               <a:defRPr/>
             </a:pPr>
             <a:r>
-              <a:rPr lang="fi-FI" sz="1600" kern="0" dirty="0">
-                <a:solidFill>
-                  <a:srgbClr val="004586"/>
-                </a:solidFill>
-                <a:latin typeface="Calibri" pitchFamily="34" charset="0"/>
-                <a:cs typeface="Calibri" pitchFamily="34" charset="0"/>
-              </a:rPr>
-              <a:t>KARMA – </a:t>
-            </a:r>
-            <a:r>
-              <a:rPr lang="fi-FI" sz="1600" kern="0" dirty="0" err="1">
-                <a:solidFill>
-                  <a:srgbClr val="004586"/>
-                </a:solidFill>
-                <a:latin typeface="Calibri" pitchFamily="34" charset="0"/>
-                <a:cs typeface="Calibri" pitchFamily="34" charset="0"/>
-              </a:rPr>
-              <a:t>Test</a:t>
-            </a:r>
-            <a:r>
-              <a:rPr lang="fi-FI" sz="1600" kern="0" dirty="0">
-                <a:solidFill>
-                  <a:srgbClr val="004586"/>
-                </a:solidFill>
-                <a:latin typeface="Calibri" pitchFamily="34" charset="0"/>
-                <a:cs typeface="Calibri" pitchFamily="34" charset="0"/>
-              </a:rPr>
-              <a:t> </a:t>
-            </a:r>
-            <a:r>
-              <a:rPr lang="fi-FI" sz="1600" kern="0" dirty="0" err="1">
-                <a:solidFill>
-                  <a:srgbClr val="004586"/>
-                </a:solidFill>
-                <a:latin typeface="Calibri" pitchFamily="34" charset="0"/>
-                <a:cs typeface="Calibri" pitchFamily="34" charset="0"/>
-              </a:rPr>
-              <a:t>runner</a:t>
-            </a:r>
-            <a:r>
-              <a:rPr lang="fi-FI" sz="1600" kern="0" dirty="0">
-                <a:solidFill>
-                  <a:srgbClr val="004586"/>
-                </a:solidFill>
-                <a:latin typeface="Calibri" pitchFamily="34" charset="0"/>
-                <a:cs typeface="Calibri" pitchFamily="34" charset="0"/>
-              </a:rPr>
-              <a:t> </a:t>
-            </a:r>
-            <a:r>
-              <a:rPr lang="fi-FI" sz="1600" kern="0" dirty="0" err="1">
-                <a:solidFill>
-                  <a:srgbClr val="004586"/>
-                </a:solidFill>
-                <a:latin typeface="Calibri" pitchFamily="34" charset="0"/>
-                <a:cs typeface="Calibri" pitchFamily="34" charset="0"/>
-              </a:rPr>
-              <a:t>tool</a:t>
-            </a:r>
-            <a:r>
-              <a:rPr lang="fi-FI" sz="1600" kern="0" dirty="0">
-                <a:solidFill>
-                  <a:srgbClr val="004586"/>
-                </a:solidFill>
-                <a:latin typeface="Calibri" pitchFamily="34" charset="0"/>
-                <a:cs typeface="Calibri" pitchFamily="34" charset="0"/>
-              </a:rPr>
-              <a:t> for </a:t>
-            </a:r>
-            <a:r>
-              <a:rPr lang="fi-FI" sz="1600" kern="0" dirty="0" err="1">
-                <a:solidFill>
-                  <a:srgbClr val="004586"/>
-                </a:solidFill>
-                <a:latin typeface="Calibri" pitchFamily="34" charset="0"/>
-                <a:cs typeface="Calibri" pitchFamily="34" charset="0"/>
-              </a:rPr>
-              <a:t>Javascript</a:t>
-            </a:r>
-            <a:endParaRPr lang="fi-FI" sz="1600" kern="0" dirty="0">
-              <a:solidFill>
-                <a:srgbClr val="004586"/>
-              </a:solidFill>
-              <a:latin typeface="Calibri" pitchFamily="34" charset="0"/>
-              <a:cs typeface="Calibri" pitchFamily="34" charset="0"/>
-            </a:endParaRPr>
+              <a:rPr lang="fi-FI" sz="1600" kern="0" dirty="0" smtClean="0">
+                <a:solidFill>
+                  <a:srgbClr val="004586"/>
+                </a:solidFill>
+                <a:latin typeface="Calibri" pitchFamily="34" charset="0"/>
+                <a:cs typeface="Calibri" pitchFamily="34" charset="0"/>
+              </a:rPr>
+              <a:t>Bower</a:t>
+            </a:r>
           </a:p>
           <a:p>
             <a:pPr indent="-311030" defTabSz="414706" eaLnBrk="0" hangingPunct="0">
@@ -7000,134 +6963,14 @@
               <a:defRPr/>
             </a:pPr>
             <a:r>
-              <a:rPr lang="fi-FI" sz="1600" kern="0" dirty="0" err="1">
-                <a:solidFill>
-                  <a:srgbClr val="004586"/>
-                </a:solidFill>
-                <a:latin typeface="Calibri" pitchFamily="34" charset="0"/>
-                <a:cs typeface="Calibri" pitchFamily="34" charset="0"/>
-              </a:rPr>
-              <a:t>GitHub</a:t>
-            </a:r>
-            <a:r>
-              <a:rPr lang="fi-FI" sz="1600" kern="0" dirty="0">
-                <a:solidFill>
-                  <a:srgbClr val="004586"/>
-                </a:solidFill>
-                <a:latin typeface="Calibri" pitchFamily="34" charset="0"/>
-                <a:cs typeface="Calibri" pitchFamily="34" charset="0"/>
-              </a:rPr>
-              <a:t> – Web </a:t>
-            </a:r>
-            <a:r>
-              <a:rPr lang="fi-FI" sz="1600" kern="0" dirty="0" err="1">
-                <a:solidFill>
-                  <a:srgbClr val="004586"/>
-                </a:solidFill>
-                <a:latin typeface="Calibri" pitchFamily="34" charset="0"/>
-                <a:cs typeface="Calibri" pitchFamily="34" charset="0"/>
-              </a:rPr>
-              <a:t>based</a:t>
-            </a:r>
-            <a:r>
-              <a:rPr lang="fi-FI" sz="1600" kern="0" dirty="0">
-                <a:solidFill>
-                  <a:srgbClr val="004586"/>
-                </a:solidFill>
-                <a:latin typeface="Calibri" pitchFamily="34" charset="0"/>
-                <a:cs typeface="Calibri" pitchFamily="34" charset="0"/>
-              </a:rPr>
-              <a:t> </a:t>
-            </a:r>
-            <a:r>
-              <a:rPr lang="fi-FI" sz="1600" kern="0" dirty="0" err="1">
-                <a:solidFill>
-                  <a:srgbClr val="004586"/>
-                </a:solidFill>
-                <a:latin typeface="Calibri" pitchFamily="34" charset="0"/>
-                <a:cs typeface="Calibri" pitchFamily="34" charset="0"/>
-              </a:rPr>
-              <a:t>source</a:t>
-            </a:r>
-            <a:r>
-              <a:rPr lang="fi-FI" sz="1600" kern="0" dirty="0">
-                <a:solidFill>
-                  <a:srgbClr val="004586"/>
-                </a:solidFill>
-                <a:latin typeface="Calibri" pitchFamily="34" charset="0"/>
-                <a:cs typeface="Calibri" pitchFamily="34" charset="0"/>
-              </a:rPr>
-              <a:t> </a:t>
-            </a:r>
-            <a:r>
-              <a:rPr lang="fi-FI" sz="1600" kern="0" dirty="0" err="1">
-                <a:solidFill>
-                  <a:srgbClr val="004586"/>
-                </a:solidFill>
-                <a:latin typeface="Calibri" pitchFamily="34" charset="0"/>
-                <a:cs typeface="Calibri" pitchFamily="34" charset="0"/>
-              </a:rPr>
-              <a:t>code</a:t>
-            </a:r>
-            <a:r>
-              <a:rPr lang="fi-FI" sz="1600" kern="0" dirty="0">
-                <a:solidFill>
-                  <a:srgbClr val="004586"/>
-                </a:solidFill>
-                <a:latin typeface="Calibri" pitchFamily="34" charset="0"/>
-                <a:cs typeface="Calibri" pitchFamily="34" charset="0"/>
-              </a:rPr>
-              <a:t> </a:t>
-            </a:r>
-            <a:r>
-              <a:rPr lang="fi-FI" sz="1600" kern="0" dirty="0" err="1">
-                <a:solidFill>
-                  <a:srgbClr val="004586"/>
-                </a:solidFill>
-                <a:latin typeface="Calibri" pitchFamily="34" charset="0"/>
-                <a:cs typeface="Calibri" pitchFamily="34" charset="0"/>
-              </a:rPr>
-              <a:t>repository</a:t>
-            </a:r>
-            <a:r>
-              <a:rPr lang="fi-FI" sz="1600" kern="0" dirty="0">
-                <a:solidFill>
-                  <a:srgbClr val="004586"/>
-                </a:solidFill>
-                <a:latin typeface="Calibri" pitchFamily="34" charset="0"/>
-                <a:cs typeface="Calibri" pitchFamily="34" charset="0"/>
-              </a:rPr>
-              <a:t> </a:t>
-            </a:r>
-            <a:r>
-              <a:rPr lang="fi-FI" sz="1600" kern="0" dirty="0" err="1">
-                <a:solidFill>
-                  <a:srgbClr val="004586"/>
-                </a:solidFill>
-                <a:latin typeface="Calibri" pitchFamily="34" charset="0"/>
-                <a:cs typeface="Calibri" pitchFamily="34" charset="0"/>
-              </a:rPr>
-              <a:t>hosting</a:t>
-            </a:r>
-            <a:r>
-              <a:rPr lang="fi-FI" sz="1600" kern="0" dirty="0">
-                <a:solidFill>
-                  <a:srgbClr val="004586"/>
-                </a:solidFill>
-                <a:latin typeface="Calibri" pitchFamily="34" charset="0"/>
-                <a:cs typeface="Calibri" pitchFamily="34" charset="0"/>
-              </a:rPr>
-              <a:t> </a:t>
-            </a:r>
-            <a:r>
-              <a:rPr lang="fi-FI" sz="1600" kern="0" dirty="0" err="1">
-                <a:solidFill>
-                  <a:srgbClr val="004586"/>
-                </a:solidFill>
-                <a:latin typeface="Calibri" pitchFamily="34" charset="0"/>
-                <a:cs typeface="Calibri" pitchFamily="34" charset="0"/>
-              </a:rPr>
-              <a:t>service</a:t>
+              <a:rPr lang="fi-FI" sz="1600" kern="0" dirty="0" smtClean="0">
+                <a:solidFill>
+                  <a:srgbClr val="004586"/>
+                </a:solidFill>
+                <a:latin typeface="Calibri" pitchFamily="34" charset="0"/>
+                <a:cs typeface="Calibri" pitchFamily="34" charset="0"/>
+              </a:rPr>
+              <a:t>Heroku – Cloud application platform</a:t>
             </a:r>
             <a:endParaRPr lang="fi-FI" sz="1600" kern="0" dirty="0">
               <a:solidFill>
@@ -7153,47 +6996,24 @@
               <a:defRPr/>
             </a:pPr>
             <a:r>
-              <a:rPr lang="fi-FI" sz="1600" kern="0" dirty="0" err="1">
-                <a:solidFill>
-                  <a:srgbClr val="004586"/>
-                </a:solidFill>
-                <a:latin typeface="Calibri" pitchFamily="34" charset="0"/>
-                <a:cs typeface="Calibri" pitchFamily="34" charset="0"/>
-              </a:rPr>
-              <a:t>Bower</a:t>
-            </a:r>
-            <a:endParaRPr lang="fi-FI" sz="1600" kern="0" dirty="0">
-              <a:solidFill>
-                <a:srgbClr val="004586"/>
-              </a:solidFill>
-              <a:latin typeface="Calibri" pitchFamily="34" charset="0"/>
-              <a:cs typeface="Calibri" pitchFamily="34" charset="0"/>
-            </a:endParaRPr>
-          </a:p>
-          <a:p>
-            <a:pPr indent="-311030" defTabSz="414706" eaLnBrk="0" hangingPunct="0">
-              <a:spcAft>
-                <a:spcPts val="0"/>
-              </a:spcAft>
-              <a:buClr>
-                <a:schemeClr val="bg1">
-                  <a:lumMod val="75000"/>
-                </a:schemeClr>
-              </a:buClr>
-              <a:buSzPct val="100000"/>
-              <a:buFont typeface="Wingdings" pitchFamily="2" charset="2"/>
-              <a:buChar char="§"/>
-              <a:defRPr/>
-            </a:pPr>
-            <a:r>
-              <a:rPr lang="fi-FI" sz="1600" kern="0" dirty="0" err="1">
-                <a:solidFill>
-                  <a:srgbClr val="004586"/>
-                </a:solidFill>
-                <a:latin typeface="Calibri" pitchFamily="34" charset="0"/>
-                <a:cs typeface="Calibri" pitchFamily="34" charset="0"/>
-              </a:rPr>
-              <a:t>Jenkins</a:t>
+              <a:rPr lang="fi-FI" sz="1600" kern="0" dirty="0" smtClean="0">
+                <a:solidFill>
+                  <a:srgbClr val="004586"/>
+                </a:solidFill>
+                <a:latin typeface="Calibri" pitchFamily="34" charset="0"/>
+                <a:cs typeface="Calibri" pitchFamily="34" charset="0"/>
+              </a:rPr>
+              <a:t>Codeship</a:t>
+            </a:r>
+            <a:r>
+              <a:rPr lang="fi-FI" sz="1600" kern="0" dirty="0" smtClean="0">
+                <a:solidFill>
+                  <a:srgbClr val="004586"/>
+                </a:solidFill>
+                <a:latin typeface="Calibri" pitchFamily="34" charset="0"/>
+                <a:cs typeface="Calibri" pitchFamily="34" charset="0"/>
+              </a:rPr>
+              <a:t> </a:t>
             </a:r>
             <a:r>
               <a:rPr lang="fi-FI" sz="1600" kern="0" dirty="0">
@@ -7203,57 +7023,17 @@
                 <a:latin typeface="Calibri" pitchFamily="34" charset="0"/>
                 <a:cs typeface="Calibri" pitchFamily="34" charset="0"/>
               </a:rPr>
-              <a:t> – </a:t>
-            </a:r>
-            <a:r>
-              <a:rPr lang="fi-FI" sz="1600" kern="0" dirty="0" err="1">
-                <a:solidFill>
-                  <a:srgbClr val="004586"/>
-                </a:solidFill>
-                <a:latin typeface="Calibri" pitchFamily="34" charset="0"/>
-                <a:cs typeface="Calibri" pitchFamily="34" charset="0"/>
-              </a:rPr>
-              <a:t>Continuous</a:t>
-            </a:r>
-            <a:r>
-              <a:rPr lang="fi-FI" sz="1600" kern="0" dirty="0">
-                <a:solidFill>
-                  <a:srgbClr val="004586"/>
-                </a:solidFill>
-                <a:latin typeface="Calibri" pitchFamily="34" charset="0"/>
-                <a:cs typeface="Calibri" pitchFamily="34" charset="0"/>
-              </a:rPr>
-              <a:t> </a:t>
-            </a:r>
-            <a:r>
-              <a:rPr lang="fi-FI" sz="1600" kern="0" dirty="0" err="1">
-                <a:solidFill>
-                  <a:srgbClr val="004586"/>
-                </a:solidFill>
-                <a:latin typeface="Calibri" pitchFamily="34" charset="0"/>
-                <a:cs typeface="Calibri" pitchFamily="34" charset="0"/>
-              </a:rPr>
-              <a:t>Integration</a:t>
-            </a:r>
-            <a:r>
-              <a:rPr lang="fi-FI" sz="1600" kern="0" dirty="0">
-                <a:solidFill>
-                  <a:srgbClr val="004586"/>
-                </a:solidFill>
-                <a:latin typeface="Calibri" pitchFamily="34" charset="0"/>
-                <a:cs typeface="Calibri" pitchFamily="34" charset="0"/>
-              </a:rPr>
-              <a:t> </a:t>
-            </a:r>
-            <a:r>
-              <a:rPr lang="fi-FI" sz="1600" kern="0" dirty="0" err="1">
-                <a:solidFill>
-                  <a:srgbClr val="004586"/>
-                </a:solidFill>
-                <a:latin typeface="Calibri" pitchFamily="34" charset="0"/>
-                <a:cs typeface="Calibri" pitchFamily="34" charset="0"/>
-              </a:rPr>
-              <a:t>server</a:t>
+              <a:t>– Continuous Integration </a:t>
+            </a:r>
+            <a:r>
+              <a:rPr lang="fi-FI" sz="1600" kern="0" dirty="0" smtClean="0">
+                <a:solidFill>
+                  <a:srgbClr val="004586"/>
+                </a:solidFill>
+                <a:latin typeface="Calibri" pitchFamily="34" charset="0"/>
+                <a:cs typeface="Calibri" pitchFamily="34" charset="0"/>
+              </a:rPr>
+              <a:t>and Delivery Platform</a:t>
             </a:r>
             <a:endParaRPr lang="fi-FI" sz="1600" kern="0" dirty="0">
               <a:solidFill>

</xml_diff>